<commit_message>
Füge neuen kombinierten Pairs-Plot und Korrelationsmatrix hinzu; aktualisiere Datenverarbeitung und Layout in der Präsentation
</commit_message>
<xml_diff>
--- a/Model Blood Donation_Präsentation Abgabe_1.pptx
+++ b/Model Blood Donation_Präsentation Abgabe_1.pptx
@@ -140,7 +140,7 @@
 <file path=ppt/revisionInfo.xml><?xml version="1.0" encoding="utf-8"?>
 <p1510:revInfo xmlns:a="http://schemas.openxmlformats.org/drawingml/2006/main" xmlns:r="http://schemas.openxmlformats.org/officeDocument/2006/relationships" xmlns:p1510="http://schemas.microsoft.com/office/powerpoint/2015/10/main">
   <p1510:revLst>
-    <p1510:client id="{97A9E315-7109-471F-9DC5-2BF2F78B4932}" v="30" dt="2025-03-19T14:04:28.882"/>
+    <p1510:client id="{97A9E315-7109-471F-9DC5-2BF2F78B4932}" v="31" dt="2025-03-19T21:36:57.905"/>
   </p1510:revLst>
 </p1510:revInfo>
 </file>
@@ -150,10 +150,33 @@
   <pc:docChgLst>
     <pc:chgData name="Matthias Kuhn" userId="9470fd36f9d6358f" providerId="LiveId" clId="{97A9E315-7109-471F-9DC5-2BF2F78B4932}"/>
     <pc:docChg chg="undo custSel addSld modSld">
-      <pc:chgData name="Matthias Kuhn" userId="9470fd36f9d6358f" providerId="LiveId" clId="{97A9E315-7109-471F-9DC5-2BF2F78B4932}" dt="2025-03-19T14:58:38.816" v="1130" actId="1076"/>
+      <pc:chgData name="Matthias Kuhn" userId="9470fd36f9d6358f" providerId="LiveId" clId="{97A9E315-7109-471F-9DC5-2BF2F78B4932}" dt="2025-03-19T22:10:46.126" v="1143" actId="478"/>
       <pc:docMkLst>
         <pc:docMk/>
       </pc:docMkLst>
+      <pc:sldChg chg="addSp delSp modSp mod">
+        <pc:chgData name="Matthias Kuhn" userId="9470fd36f9d6358f" providerId="LiveId" clId="{97A9E315-7109-471F-9DC5-2BF2F78B4932}" dt="2025-03-19T21:37:01.782" v="1132" actId="1076"/>
+        <pc:sldMkLst>
+          <pc:docMk/>
+          <pc:sldMk cId="2970872305" sldId="277"/>
+        </pc:sldMkLst>
+        <pc:spChg chg="del">
+          <ac:chgData name="Matthias Kuhn" userId="9470fd36f9d6358f" providerId="LiveId" clId="{97A9E315-7109-471F-9DC5-2BF2F78B4932}" dt="2025-03-19T21:36:57.905" v="1131" actId="22"/>
+          <ac:spMkLst>
+            <pc:docMk/>
+            <pc:sldMk cId="2970872305" sldId="277"/>
+            <ac:spMk id="3" creationId="{DF24150B-7C58-7CEB-D700-96D71074451E}"/>
+          </ac:spMkLst>
+        </pc:spChg>
+        <pc:picChg chg="add mod ord">
+          <ac:chgData name="Matthias Kuhn" userId="9470fd36f9d6358f" providerId="LiveId" clId="{97A9E315-7109-471F-9DC5-2BF2F78B4932}" dt="2025-03-19T21:37:01.782" v="1132" actId="1076"/>
+          <ac:picMkLst>
+            <pc:docMk/>
+            <pc:sldMk cId="2970872305" sldId="277"/>
+            <ac:picMk id="5" creationId="{14CA2442-2352-2767-71C5-71109A3CFABB}"/>
+          </ac:picMkLst>
+        </pc:picChg>
+      </pc:sldChg>
       <pc:sldChg chg="addSp delSp modSp mod">
         <pc:chgData name="Matthias Kuhn" userId="9470fd36f9d6358f" providerId="LiveId" clId="{97A9E315-7109-471F-9DC5-2BF2F78B4932}" dt="2025-03-19T11:58:05.249" v="979" actId="1076"/>
         <pc:sldMkLst>
@@ -456,7 +479,7 @@
         </pc:picChg>
       </pc:sldChg>
       <pc:sldChg chg="addSp delSp modSp add mod">
-        <pc:chgData name="Matthias Kuhn" userId="9470fd36f9d6358f" providerId="LiveId" clId="{97A9E315-7109-471F-9DC5-2BF2F78B4932}" dt="2025-03-19T10:03:44.827" v="727" actId="20577"/>
+        <pc:chgData name="Matthias Kuhn" userId="9470fd36f9d6358f" providerId="LiveId" clId="{97A9E315-7109-471F-9DC5-2BF2F78B4932}" dt="2025-03-19T22:10:46.126" v="1143" actId="478"/>
         <pc:sldMkLst>
           <pc:docMk/>
           <pc:sldMk cId="4078144345" sldId="283"/>
@@ -478,7 +501,7 @@
           </ac:spMkLst>
         </pc:spChg>
         <pc:spChg chg="add mod">
-          <ac:chgData name="Matthias Kuhn" userId="9470fd36f9d6358f" providerId="LiveId" clId="{97A9E315-7109-471F-9DC5-2BF2F78B4932}" dt="2025-03-19T09:59:56.462" v="572" actId="692"/>
+          <ac:chgData name="Matthias Kuhn" userId="9470fd36f9d6358f" providerId="LiveId" clId="{97A9E315-7109-471F-9DC5-2BF2F78B4932}" dt="2025-03-19T21:37:29.590" v="1136" actId="1076"/>
           <ac:spMkLst>
             <pc:docMk/>
             <pc:sldMk cId="4078144345" sldId="283"/>
@@ -486,7 +509,7 @@
           </ac:spMkLst>
         </pc:spChg>
         <pc:spChg chg="add mod">
-          <ac:chgData name="Matthias Kuhn" userId="9470fd36f9d6358f" providerId="LiveId" clId="{97A9E315-7109-471F-9DC5-2BF2F78B4932}" dt="2025-03-19T10:02:39.725" v="679" actId="1076"/>
+          <ac:chgData name="Matthias Kuhn" userId="9470fd36f9d6358f" providerId="LiveId" clId="{97A9E315-7109-471F-9DC5-2BF2F78B4932}" dt="2025-03-19T21:37:32.195" v="1137" actId="1076"/>
           <ac:spMkLst>
             <pc:docMk/>
             <pc:sldMk cId="4078144345" sldId="283"/>
@@ -510,7 +533,7 @@
           </ac:spMkLst>
         </pc:spChg>
         <pc:picChg chg="add mod">
-          <ac:chgData name="Matthias Kuhn" userId="9470fd36f9d6358f" providerId="LiveId" clId="{97A9E315-7109-471F-9DC5-2BF2F78B4932}" dt="2025-03-19T09:53:18.579" v="220" actId="14100"/>
+          <ac:chgData name="Matthias Kuhn" userId="9470fd36f9d6358f" providerId="LiveId" clId="{97A9E315-7109-471F-9DC5-2BF2F78B4932}" dt="2025-03-19T21:37:36.866" v="1138" actId="14100"/>
           <ac:picMkLst>
             <pc:docMk/>
             <pc:sldMk cId="4078144345" sldId="283"/>
@@ -534,7 +557,7 @@
           </ac:picMkLst>
         </pc:picChg>
         <pc:picChg chg="add mod">
-          <ac:chgData name="Matthias Kuhn" userId="9470fd36f9d6358f" providerId="LiveId" clId="{97A9E315-7109-471F-9DC5-2BF2F78B4932}" dt="2025-03-19T09:43:41.009" v="45" actId="1076"/>
+          <ac:chgData name="Matthias Kuhn" userId="9470fd36f9d6358f" providerId="LiveId" clId="{97A9E315-7109-471F-9DC5-2BF2F78B4932}" dt="2025-03-19T21:37:44.771" v="1139" actId="1076"/>
           <ac:picMkLst>
             <pc:docMk/>
             <pc:sldMk cId="4078144345" sldId="283"/>
@@ -542,11 +565,35 @@
           </ac:picMkLst>
         </pc:picChg>
         <pc:picChg chg="add mod">
-          <ac:chgData name="Matthias Kuhn" userId="9470fd36f9d6358f" providerId="LiveId" clId="{97A9E315-7109-471F-9DC5-2BF2F78B4932}" dt="2025-03-19T09:44:11.909" v="50" actId="1076"/>
+          <ac:chgData name="Matthias Kuhn" userId="9470fd36f9d6358f" providerId="LiveId" clId="{97A9E315-7109-471F-9DC5-2BF2F78B4932}" dt="2025-03-19T21:37:20.432" v="1134" actId="14100"/>
           <ac:picMkLst>
             <pc:docMk/>
             <pc:sldMk cId="4078144345" sldId="283"/>
             <ac:picMk id="12" creationId="{602BC7F6-F2E1-8EA4-1C61-D5F8FE66F1FB}"/>
+          </ac:picMkLst>
+        </pc:picChg>
+        <pc:picChg chg="add">
+          <ac:chgData name="Matthias Kuhn" userId="9470fd36f9d6358f" providerId="LiveId" clId="{97A9E315-7109-471F-9DC5-2BF2F78B4932}" dt="2025-03-19T22:10:33.353" v="1140" actId="22"/>
+          <ac:picMkLst>
+            <pc:docMk/>
+            <pc:sldMk cId="4078144345" sldId="283"/>
+            <ac:picMk id="17" creationId="{983E9E90-A976-ED7F-0238-2326332CEEF6}"/>
+          </ac:picMkLst>
+        </pc:picChg>
+        <pc:picChg chg="add">
+          <ac:chgData name="Matthias Kuhn" userId="9470fd36f9d6358f" providerId="LiveId" clId="{97A9E315-7109-471F-9DC5-2BF2F78B4932}" dt="2025-03-19T22:10:35.516" v="1141" actId="22"/>
+          <ac:picMkLst>
+            <pc:docMk/>
+            <pc:sldMk cId="4078144345" sldId="283"/>
+            <ac:picMk id="20" creationId="{3CD150D3-FE1B-89B2-9C16-E3AA3E6948D6}"/>
+          </ac:picMkLst>
+        </pc:picChg>
+        <pc:picChg chg="add del">
+          <ac:chgData name="Matthias Kuhn" userId="9470fd36f9d6358f" providerId="LiveId" clId="{97A9E315-7109-471F-9DC5-2BF2F78B4932}" dt="2025-03-19T22:10:46.126" v="1143" actId="478"/>
+          <ac:picMkLst>
+            <pc:docMk/>
+            <pc:sldMk cId="4078144345" sldId="283"/>
+            <ac:picMk id="22" creationId="{E9CD2082-5403-5A95-5AEC-7B30CA2FFDAF}"/>
           </ac:picMkLst>
         </pc:picChg>
         <pc:picChg chg="del">
@@ -4092,31 +4139,35 @@
           </a:p>
         </p:txBody>
       </p:sp>
-      <p:sp>
-        <p:nvSpPr>
-          <p:cNvPr id="3" name="Inhaltsplatzhalter 2">
-            <a:extLst>
-              <a:ext uri="{FF2B5EF4-FFF2-40B4-BE49-F238E27FC236}">
-                <a16:creationId xmlns:a16="http://schemas.microsoft.com/office/drawing/2014/main" id="{DF24150B-7C58-7CEB-D700-96D71074451E}"/>
-              </a:ext>
-            </a:extLst>
-          </p:cNvPr>
-          <p:cNvSpPr>
-            <a:spLocks noGrp="1"/>
-          </p:cNvSpPr>
+      <p:pic>
+        <p:nvPicPr>
+          <p:cNvPr id="5" name="Inhaltsplatzhalter 4">
+            <a:extLst>
+              <a:ext uri="{FF2B5EF4-FFF2-40B4-BE49-F238E27FC236}">
+                <a16:creationId xmlns:a16="http://schemas.microsoft.com/office/drawing/2014/main" id="{14CA2442-2352-2767-71C5-71109A3CFABB}"/>
+              </a:ext>
+            </a:extLst>
+          </p:cNvPr>
+          <p:cNvPicPr>
+            <a:picLocks noGrp="1" noChangeAspect="1"/>
+          </p:cNvPicPr>
           <p:nvPr>
             <p:ph idx="1"/>
           </p:nvPr>
-        </p:nvSpPr>
-        <p:spPr/>
-        <p:txBody>
-          <a:bodyPr/>
-          <a:lstStyle/>
-          <a:p>
-            <a:endParaRPr lang="de-CH" dirty="0"/>
-          </a:p>
-        </p:txBody>
-      </p:sp>
+        </p:nvPicPr>
+        <p:blipFill>
+          <a:blip r:embed="rId2"/>
+          <a:stretch>
+            <a:fillRect/>
+          </a:stretch>
+        </p:blipFill>
+        <p:spPr>
+          <a:xfrm>
+            <a:off x="725716" y="1690688"/>
+            <a:ext cx="5800077" cy="4351338"/>
+          </a:xfrm>
+        </p:spPr>
+      </p:pic>
     </p:spTree>
     <p:extLst>
       <p:ext uri="{BB962C8B-B14F-4D97-AF65-F5344CB8AC3E}">
@@ -8523,7 +8574,7 @@
         <p:spPr>
           <a:xfrm>
             <a:off x="184061" y="1143000"/>
-            <a:ext cx="5834601" cy="3838433"/>
+            <a:ext cx="6576591" cy="4326569"/>
           </a:xfrm>
           <a:prstGeom prst="rect">
             <a:avLst/>
@@ -8552,7 +8603,7 @@
         </p:blipFill>
         <p:spPr>
           <a:xfrm>
-            <a:off x="6973546" y="1174749"/>
+            <a:off x="6973545" y="1159831"/>
             <a:ext cx="4887007" cy="428685"/>
           </a:xfrm>
           <a:prstGeom prst="rect">
@@ -8582,8 +8633,8 @@
         </p:blipFill>
         <p:spPr>
           <a:xfrm>
-            <a:off x="7373596" y="1603434"/>
-            <a:ext cx="3815104" cy="3033880"/>
+            <a:off x="6973546" y="1583282"/>
+            <a:ext cx="4887006" cy="3886287"/>
           </a:xfrm>
           <a:prstGeom prst="rect">
             <a:avLst/>
@@ -8604,7 +8655,7 @@
         </p:nvSpPr>
         <p:spPr>
           <a:xfrm>
-            <a:off x="184061" y="5247946"/>
+            <a:off x="123826" y="5542747"/>
             <a:ext cx="6673939" cy="1169551"/>
           </a:xfrm>
           <a:prstGeom prst="rect">
@@ -8729,7 +8780,7 @@
         </p:nvSpPr>
         <p:spPr>
           <a:xfrm>
-            <a:off x="7373596" y="5254566"/>
+            <a:off x="7038649" y="5542747"/>
             <a:ext cx="3815104" cy="400110"/>
           </a:xfrm>
           <a:prstGeom prst="rect">
@@ -8784,6 +8835,66 @@
           </a:p>
         </p:txBody>
       </p:sp>
+      <p:pic>
+        <p:nvPicPr>
+          <p:cNvPr id="17" name="Grafik 16">
+            <a:extLst>
+              <a:ext uri="{FF2B5EF4-FFF2-40B4-BE49-F238E27FC236}">
+                <a16:creationId xmlns:a16="http://schemas.microsoft.com/office/drawing/2014/main" id="{983E9E90-A976-ED7F-0238-2326332CEEF6}"/>
+              </a:ext>
+            </a:extLst>
+          </p:cNvPr>
+          <p:cNvPicPr>
+            <a:picLocks noChangeAspect="1"/>
+          </p:cNvPicPr>
+          <p:nvPr/>
+        </p:nvPicPr>
+        <p:blipFill>
+          <a:blip r:embed="rId5"/>
+          <a:stretch>
+            <a:fillRect/>
+          </a:stretch>
+        </p:blipFill>
+        <p:spPr>
+          <a:xfrm>
+            <a:off x="0" y="16731"/>
+            <a:ext cx="12192000" cy="6824538"/>
+          </a:xfrm>
+          <a:prstGeom prst="rect">
+            <a:avLst/>
+          </a:prstGeom>
+        </p:spPr>
+      </p:pic>
+      <p:pic>
+        <p:nvPicPr>
+          <p:cNvPr id="20" name="Grafik 19">
+            <a:extLst>
+              <a:ext uri="{FF2B5EF4-FFF2-40B4-BE49-F238E27FC236}">
+                <a16:creationId xmlns:a16="http://schemas.microsoft.com/office/drawing/2014/main" id="{3CD150D3-FE1B-89B2-9C16-E3AA3E6948D6}"/>
+              </a:ext>
+            </a:extLst>
+          </p:cNvPr>
+          <p:cNvPicPr>
+            <a:picLocks noChangeAspect="1"/>
+          </p:cNvPicPr>
+          <p:nvPr/>
+        </p:nvPicPr>
+        <p:blipFill>
+          <a:blip r:embed="rId5"/>
+          <a:stretch>
+            <a:fillRect/>
+          </a:stretch>
+        </p:blipFill>
+        <p:spPr>
+          <a:xfrm>
+            <a:off x="0" y="16731"/>
+            <a:ext cx="12192000" cy="6824538"/>
+          </a:xfrm>
+          <a:prstGeom prst="rect">
+            <a:avLst/>
+          </a:prstGeom>
+        </p:spPr>
+      </p:pic>
     </p:spTree>
     <p:extLst>
       <p:ext uri="{BB962C8B-B14F-4D97-AF65-F5344CB8AC3E}">

</xml_diff>

<commit_message>
Füge neue Folien zur Präsentation hinzu; aktualisiere R-Skripte für Datenvisualisierung und bereinige nicht mehr benötigte Dateien
</commit_message>
<xml_diff>
--- a/Model Blood Donation_Präsentation Abgabe_1.pptx
+++ b/Model Blood Donation_Präsentation Abgabe_1.pptx
@@ -149,8 +149,8 @@
 <pc:chgInfo xmlns:a="http://schemas.openxmlformats.org/drawingml/2006/main" xmlns:r="http://schemas.openxmlformats.org/officeDocument/2006/relationships" xmlns:ac="http://schemas.microsoft.com/office/drawing/2013/main/command" xmlns:pc="http://schemas.microsoft.com/office/powerpoint/2013/main/command">
   <pc:docChgLst>
     <pc:chgData name="Matthias Kuhn" userId="9470fd36f9d6358f" providerId="LiveId" clId="{97A9E315-7109-471F-9DC5-2BF2F78B4932}"/>
-    <pc:docChg chg="undo custSel addSld modSld">
-      <pc:chgData name="Matthias Kuhn" userId="9470fd36f9d6358f" providerId="LiveId" clId="{97A9E315-7109-471F-9DC5-2BF2F78B4932}" dt="2025-03-19T22:10:46.126" v="1143" actId="478"/>
+    <pc:docChg chg="undo custSel addSld delSld modSld">
+      <pc:chgData name="Matthias Kuhn" userId="9470fd36f9d6358f" providerId="LiveId" clId="{97A9E315-7109-471F-9DC5-2BF2F78B4932}" dt="2025-03-28T15:29:38.702" v="1152" actId="2696"/>
       <pc:docMkLst>
         <pc:docMk/>
       </pc:docMkLst>
@@ -160,14 +160,6 @@
           <pc:docMk/>
           <pc:sldMk cId="2970872305" sldId="277"/>
         </pc:sldMkLst>
-        <pc:spChg chg="del">
-          <ac:chgData name="Matthias Kuhn" userId="9470fd36f9d6358f" providerId="LiveId" clId="{97A9E315-7109-471F-9DC5-2BF2F78B4932}" dt="2025-03-19T21:36:57.905" v="1131" actId="22"/>
-          <ac:spMkLst>
-            <pc:docMk/>
-            <pc:sldMk cId="2970872305" sldId="277"/>
-            <ac:spMk id="3" creationId="{DF24150B-7C58-7CEB-D700-96D71074451E}"/>
-          </ac:spMkLst>
-        </pc:spChg>
         <pc:picChg chg="add mod ord">
           <ac:chgData name="Matthias Kuhn" userId="9470fd36f9d6358f" providerId="LiveId" clId="{97A9E315-7109-471F-9DC5-2BF2F78B4932}" dt="2025-03-19T21:37:01.782" v="1132" actId="1076"/>
           <ac:picMkLst>
@@ -177,20 +169,27 @@
           </ac:picMkLst>
         </pc:picChg>
       </pc:sldChg>
+      <pc:sldChg chg="modSp mod">
+        <pc:chgData name="Matthias Kuhn" userId="9470fd36f9d6358f" providerId="LiveId" clId="{97A9E315-7109-471F-9DC5-2BF2F78B4932}" dt="2025-03-28T11:22:41.786" v="1145" actId="1076"/>
+        <pc:sldMkLst>
+          <pc:docMk/>
+          <pc:sldMk cId="42782039" sldId="279"/>
+        </pc:sldMkLst>
+        <pc:picChg chg="mod">
+          <ac:chgData name="Matthias Kuhn" userId="9470fd36f9d6358f" providerId="LiveId" clId="{97A9E315-7109-471F-9DC5-2BF2F78B4932}" dt="2025-03-28T11:22:41.786" v="1145" actId="1076"/>
+          <ac:picMkLst>
+            <pc:docMk/>
+            <pc:sldMk cId="42782039" sldId="279"/>
+            <ac:picMk id="11" creationId="{2587AFDA-55F8-EA94-D648-29580D6B04BD}"/>
+          </ac:picMkLst>
+        </pc:picChg>
+      </pc:sldChg>
       <pc:sldChg chg="addSp delSp modSp mod">
         <pc:chgData name="Matthias Kuhn" userId="9470fd36f9d6358f" providerId="LiveId" clId="{97A9E315-7109-471F-9DC5-2BF2F78B4932}" dt="2025-03-19T11:58:05.249" v="979" actId="1076"/>
         <pc:sldMkLst>
           <pc:docMk/>
           <pc:sldMk cId="3484131850" sldId="280"/>
         </pc:sldMkLst>
-        <pc:spChg chg="add">
-          <ac:chgData name="Matthias Kuhn" userId="9470fd36f9d6358f" providerId="LiveId" clId="{97A9E315-7109-471F-9DC5-2BF2F78B4932}" dt="2025-03-19T09:37:22.292" v="7"/>
-          <ac:spMkLst>
-            <pc:docMk/>
-            <pc:sldMk cId="3484131850" sldId="280"/>
-            <ac:spMk id="4" creationId="{05A6DDEE-7D99-A7F3-E9F4-5D438B71637D}"/>
-          </ac:spMkLst>
-        </pc:spChg>
         <pc:spChg chg="mod">
           <ac:chgData name="Matthias Kuhn" userId="9470fd36f9d6358f" providerId="LiveId" clId="{97A9E315-7109-471F-9DC5-2BF2F78B4932}" dt="2025-03-19T11:57:55.518" v="976" actId="1076"/>
           <ac:spMkLst>
@@ -199,28 +198,12 @@
             <ac:spMk id="5" creationId="{43ADDD0F-BEEC-094E-F8E3-4A83D6121CB3}"/>
           </ac:spMkLst>
         </pc:spChg>
-        <pc:picChg chg="add del mod">
-          <ac:chgData name="Matthias Kuhn" userId="9470fd36f9d6358f" providerId="LiveId" clId="{97A9E315-7109-471F-9DC5-2BF2F78B4932}" dt="2025-03-19T09:37:21.778" v="6" actId="478"/>
-          <ac:picMkLst>
-            <pc:docMk/>
-            <pc:sldMk cId="3484131850" sldId="280"/>
-            <ac:picMk id="3" creationId="{2FDBA6B2-82C8-A8E2-7B86-8D26444A38CF}"/>
-          </ac:picMkLst>
-        </pc:picChg>
         <pc:picChg chg="add mod">
           <ac:chgData name="Matthias Kuhn" userId="9470fd36f9d6358f" providerId="LiveId" clId="{97A9E315-7109-471F-9DC5-2BF2F78B4932}" dt="2025-03-19T11:58:05.249" v="979" actId="1076"/>
           <ac:picMkLst>
             <pc:docMk/>
             <pc:sldMk cId="3484131850" sldId="280"/>
             <ac:picMk id="7" creationId="{1ABD79EE-44C2-51B3-BAC1-800DEC91F7D5}"/>
-          </ac:picMkLst>
-        </pc:picChg>
-        <pc:picChg chg="del">
-          <ac:chgData name="Matthias Kuhn" userId="9470fd36f9d6358f" providerId="LiveId" clId="{97A9E315-7109-471F-9DC5-2BF2F78B4932}" dt="2025-03-19T09:35:38.410" v="0" actId="478"/>
-          <ac:picMkLst>
-            <pc:docMk/>
-            <pc:sldMk cId="3484131850" sldId="280"/>
-            <ac:picMk id="2050" creationId="{B16F3B4B-0E34-526F-6FA9-01C72BA9AAEB}"/>
           </ac:picMkLst>
         </pc:picChg>
       </pc:sldChg>
@@ -230,36 +213,12 @@
           <pc:docMk/>
           <pc:sldMk cId="343319770" sldId="281"/>
         </pc:sldMkLst>
-        <pc:spChg chg="add del">
-          <ac:chgData name="Matthias Kuhn" userId="9470fd36f9d6358f" providerId="LiveId" clId="{97A9E315-7109-471F-9DC5-2BF2F78B4932}" dt="2025-03-19T14:43:31.916" v="995" actId="22"/>
-          <ac:spMkLst>
-            <pc:docMk/>
-            <pc:sldMk cId="343319770" sldId="281"/>
-            <ac:spMk id="7" creationId="{A9F4489B-098B-9DBF-6700-BA2DF7250BF5}"/>
-          </ac:spMkLst>
-        </pc:spChg>
-        <pc:picChg chg="add del mod">
-          <ac:chgData name="Matthias Kuhn" userId="9470fd36f9d6358f" providerId="LiveId" clId="{97A9E315-7109-471F-9DC5-2BF2F78B4932}" dt="2025-03-19T09:41:55.141" v="33" actId="478"/>
-          <ac:picMkLst>
-            <pc:docMk/>
-            <pc:sldMk cId="343319770" sldId="281"/>
-            <ac:picMk id="5" creationId="{4F330AC5-7A9D-7FC7-6608-7EE5A89461F1}"/>
-          </ac:picMkLst>
-        </pc:picChg>
         <pc:picChg chg="add mod">
           <ac:chgData name="Matthias Kuhn" userId="9470fd36f9d6358f" providerId="LiveId" clId="{97A9E315-7109-471F-9DC5-2BF2F78B4932}" dt="2025-03-19T14:58:38.816" v="1130" actId="1076"/>
           <ac:picMkLst>
             <pc:docMk/>
             <pc:sldMk cId="343319770" sldId="281"/>
             <ac:picMk id="9" creationId="{DF3BF27F-98BF-27A4-D468-CD3602AEA312}"/>
-          </ac:picMkLst>
-        </pc:picChg>
-        <pc:picChg chg="add del mod">
-          <ac:chgData name="Matthias Kuhn" userId="9470fd36f9d6358f" providerId="LiveId" clId="{97A9E315-7109-471F-9DC5-2BF2F78B4932}" dt="2025-03-19T14:43:40.599" v="998" actId="478"/>
-          <ac:picMkLst>
-            <pc:docMk/>
-            <pc:sldMk cId="343319770" sldId="281"/>
-            <ac:picMk id="18" creationId="{9E4555DB-990C-507D-56CD-ACCD3323207E}"/>
           </ac:picMkLst>
         </pc:picChg>
       </pc:sldChg>
@@ -277,14 +236,6 @@
             <ac:spMk id="3" creationId="{3AF9F2E4-4919-431E-5364-898CB82C3978}"/>
           </ac:spMkLst>
         </pc:spChg>
-        <pc:spChg chg="add">
-          <ac:chgData name="Matthias Kuhn" userId="9470fd36f9d6358f" providerId="LiveId" clId="{97A9E315-7109-471F-9DC5-2BF2F78B4932}" dt="2025-03-19T09:49:10.703" v="92"/>
-          <ac:spMkLst>
-            <pc:docMk/>
-            <pc:sldMk cId="1106488637" sldId="282"/>
-            <ac:spMk id="8" creationId="{45E88771-B915-F5AE-8E6E-6FCE5941EEE0}"/>
-          </ac:spMkLst>
-        </pc:spChg>
         <pc:spChg chg="mod">
           <ac:chgData name="Matthias Kuhn" userId="9470fd36f9d6358f" providerId="LiveId" clId="{97A9E315-7109-471F-9DC5-2BF2F78B4932}" dt="2025-03-19T13:39:40.179" v="981" actId="2085"/>
           <ac:spMkLst>
@@ -293,140 +244,12 @@
             <ac:spMk id="19" creationId="{F0425418-66B7-C519-ABC6-FF8DDE2223BA}"/>
           </ac:spMkLst>
         </pc:spChg>
-        <pc:picChg chg="add del mod">
-          <ac:chgData name="Matthias Kuhn" userId="9470fd36f9d6358f" providerId="LiveId" clId="{97A9E315-7109-471F-9DC5-2BF2F78B4932}" dt="2025-03-19T09:39:08.542" v="19" actId="22"/>
-          <ac:picMkLst>
-            <pc:docMk/>
-            <pc:sldMk cId="1106488637" sldId="282"/>
-            <ac:picMk id="4" creationId="{2A5DFDE2-2EB1-0F19-AA53-E9E6E73BA43A}"/>
-          </ac:picMkLst>
-        </pc:picChg>
-        <pc:picChg chg="add del">
-          <ac:chgData name="Matthias Kuhn" userId="9470fd36f9d6358f" providerId="LiveId" clId="{97A9E315-7109-471F-9DC5-2BF2F78B4932}" dt="2025-03-19T09:39:19.903" v="21" actId="22"/>
-          <ac:picMkLst>
-            <pc:docMk/>
-            <pc:sldMk cId="1106488637" sldId="282"/>
-            <ac:picMk id="7" creationId="{33B2E28E-CED5-182A-5C3B-3C5F3C28A010}"/>
-          </ac:picMkLst>
-        </pc:picChg>
-        <pc:picChg chg="add del mod">
-          <ac:chgData name="Matthias Kuhn" userId="9470fd36f9d6358f" providerId="LiveId" clId="{97A9E315-7109-471F-9DC5-2BF2F78B4932}" dt="2025-03-19T09:49:33.054" v="96" actId="22"/>
-          <ac:picMkLst>
-            <pc:docMk/>
-            <pc:sldMk cId="1106488637" sldId="282"/>
-            <ac:picMk id="10" creationId="{40E1CBDC-B725-9ED7-54A8-28254F86DE79}"/>
-          </ac:picMkLst>
-        </pc:picChg>
-        <pc:picChg chg="add del mod">
-          <ac:chgData name="Matthias Kuhn" userId="9470fd36f9d6358f" providerId="LiveId" clId="{97A9E315-7109-471F-9DC5-2BF2F78B4932}" dt="2025-03-19T14:47:11.049" v="1029" actId="478"/>
-          <ac:picMkLst>
-            <pc:docMk/>
-            <pc:sldMk cId="1106488637" sldId="282"/>
-            <ac:picMk id="12" creationId="{7F89394A-E47B-4624-F7D3-E8D1167A73E4}"/>
-          </ac:picMkLst>
-        </pc:picChg>
-        <pc:picChg chg="add del mod">
-          <ac:chgData name="Matthias Kuhn" userId="9470fd36f9d6358f" providerId="LiveId" clId="{97A9E315-7109-471F-9DC5-2BF2F78B4932}" dt="2025-03-19T13:40:30.259" v="986" actId="478"/>
-          <ac:picMkLst>
-            <pc:docMk/>
-            <pc:sldMk cId="1106488637" sldId="282"/>
-            <ac:picMk id="14" creationId="{B0DC4A0D-C1B6-CC8C-C3A4-885C7FCD3DE1}"/>
-          </ac:picMkLst>
-        </pc:picChg>
         <pc:picChg chg="add mod">
           <ac:chgData name="Matthias Kuhn" userId="9470fd36f9d6358f" providerId="LiveId" clId="{97A9E315-7109-471F-9DC5-2BF2F78B4932}" dt="2025-03-19T14:58:22.571" v="1128" actId="1076"/>
           <ac:picMkLst>
             <pc:docMk/>
             <pc:sldMk cId="1106488637" sldId="282"/>
             <ac:picMk id="16" creationId="{5062BCD1-E158-A88C-DA3D-4DC23001412C}"/>
-          </ac:picMkLst>
-        </pc:picChg>
-        <pc:picChg chg="add del">
-          <ac:chgData name="Matthias Kuhn" userId="9470fd36f9d6358f" providerId="LiveId" clId="{97A9E315-7109-471F-9DC5-2BF2F78B4932}" dt="2025-03-19T14:04:27.582" v="990" actId="21"/>
-          <ac:picMkLst>
-            <pc:docMk/>
-            <pc:sldMk cId="1106488637" sldId="282"/>
-            <ac:picMk id="18" creationId="{9E4555DB-990C-507D-56CD-ACCD3323207E}"/>
-          </ac:picMkLst>
-        </pc:picChg>
-        <pc:picChg chg="add del mod">
-          <ac:chgData name="Matthias Kuhn" userId="9470fd36f9d6358f" providerId="LiveId" clId="{97A9E315-7109-471F-9DC5-2BF2F78B4932}" dt="2025-03-19T14:45:36.210" v="1012" actId="478"/>
-          <ac:picMkLst>
-            <pc:docMk/>
-            <pc:sldMk cId="1106488637" sldId="282"/>
-            <ac:picMk id="21" creationId="{9E162CD3-DECD-AC54-3952-61DC43F48F79}"/>
-          </ac:picMkLst>
-        </pc:picChg>
-        <pc:picChg chg="add del mod">
-          <ac:chgData name="Matthias Kuhn" userId="9470fd36f9d6358f" providerId="LiveId" clId="{97A9E315-7109-471F-9DC5-2BF2F78B4932}" dt="2025-03-19T14:51:45.787" v="1061" actId="478"/>
-          <ac:picMkLst>
-            <pc:docMk/>
-            <pc:sldMk cId="1106488637" sldId="282"/>
-            <ac:picMk id="23" creationId="{52511644-D4BC-6A75-B1B9-A209C0A04B8A}"/>
-          </ac:picMkLst>
-        </pc:picChg>
-        <pc:picChg chg="add del mod">
-          <ac:chgData name="Matthias Kuhn" userId="9470fd36f9d6358f" providerId="LiveId" clId="{97A9E315-7109-471F-9DC5-2BF2F78B4932}" dt="2025-03-19T14:51:04.052" v="1060" actId="478"/>
-          <ac:picMkLst>
-            <pc:docMk/>
-            <pc:sldMk cId="1106488637" sldId="282"/>
-            <ac:picMk id="25" creationId="{41205655-C8E5-3C91-1CFF-09AD9CEAFEDD}"/>
-          </ac:picMkLst>
-        </pc:picChg>
-        <pc:picChg chg="add del mod">
-          <ac:chgData name="Matthias Kuhn" userId="9470fd36f9d6358f" providerId="LiveId" clId="{97A9E315-7109-471F-9DC5-2BF2F78B4932}" dt="2025-03-19T14:51:49.432" v="1065" actId="478"/>
-          <ac:picMkLst>
-            <pc:docMk/>
-            <pc:sldMk cId="1106488637" sldId="282"/>
-            <ac:picMk id="27" creationId="{222C90AD-E18D-E33E-431B-D029F094B46A}"/>
-          </ac:picMkLst>
-        </pc:picChg>
-        <pc:picChg chg="add del mod">
-          <ac:chgData name="Matthias Kuhn" userId="9470fd36f9d6358f" providerId="LiveId" clId="{97A9E315-7109-471F-9DC5-2BF2F78B4932}" dt="2025-03-19T14:49:15.325" v="1047" actId="22"/>
-          <ac:picMkLst>
-            <pc:docMk/>
-            <pc:sldMk cId="1106488637" sldId="282"/>
-            <ac:picMk id="29" creationId="{03A32246-8E3B-5E22-E7A9-0F2ECFCA2538}"/>
-          </ac:picMkLst>
-        </pc:picChg>
-        <pc:picChg chg="add del">
-          <ac:chgData name="Matthias Kuhn" userId="9470fd36f9d6358f" providerId="LiveId" clId="{97A9E315-7109-471F-9DC5-2BF2F78B4932}" dt="2025-03-19T14:49:12.759" v="1042" actId="22"/>
-          <ac:picMkLst>
-            <pc:docMk/>
-            <pc:sldMk cId="1106488637" sldId="282"/>
-            <ac:picMk id="31" creationId="{42897406-2158-2595-53C3-20E788F95365}"/>
-          </ac:picMkLst>
-        </pc:picChg>
-        <pc:picChg chg="add del mod">
-          <ac:chgData name="Matthias Kuhn" userId="9470fd36f9d6358f" providerId="LiveId" clId="{97A9E315-7109-471F-9DC5-2BF2F78B4932}" dt="2025-03-19T14:51:46.739" v="1062" actId="478"/>
-          <ac:picMkLst>
-            <pc:docMk/>
-            <pc:sldMk cId="1106488637" sldId="282"/>
-            <ac:picMk id="33" creationId="{E649C15D-7791-5DD0-569A-11C0BDF2CD12}"/>
-          </ac:picMkLst>
-        </pc:picChg>
-        <pc:picChg chg="add del mod">
-          <ac:chgData name="Matthias Kuhn" userId="9470fd36f9d6358f" providerId="LiveId" clId="{97A9E315-7109-471F-9DC5-2BF2F78B4932}" dt="2025-03-19T14:51:47.771" v="1063" actId="478"/>
-          <ac:picMkLst>
-            <pc:docMk/>
-            <pc:sldMk cId="1106488637" sldId="282"/>
-            <ac:picMk id="35" creationId="{9132482C-F2FA-69A9-AD72-BE882092FF3B}"/>
-          </ac:picMkLst>
-        </pc:picChg>
-        <pc:picChg chg="add del mod">
-          <ac:chgData name="Matthias Kuhn" userId="9470fd36f9d6358f" providerId="LiveId" clId="{97A9E315-7109-471F-9DC5-2BF2F78B4932}" dt="2025-03-19T14:51:48.571" v="1064" actId="478"/>
-          <ac:picMkLst>
-            <pc:docMk/>
-            <pc:sldMk cId="1106488637" sldId="282"/>
-            <ac:picMk id="37" creationId="{13C50E2C-2BBF-504F-0EB9-E844FC8925CA}"/>
-          </ac:picMkLst>
-        </pc:picChg>
-        <pc:picChg chg="add del mod">
-          <ac:chgData name="Matthias Kuhn" userId="9470fd36f9d6358f" providerId="LiveId" clId="{97A9E315-7109-471F-9DC5-2BF2F78B4932}" dt="2025-03-19T14:52:19.272" v="1068" actId="478"/>
-          <ac:picMkLst>
-            <pc:docMk/>
-            <pc:sldMk cId="1106488637" sldId="282"/>
-            <ac:picMk id="39" creationId="{9EB9470C-47AD-2F31-79D1-8571960EC4C6}"/>
           </ac:picMkLst>
         </pc:picChg>
         <pc:picChg chg="add mod">
@@ -461,22 +284,6 @@
             <ac:picMk id="47" creationId="{6CEFC66E-0BCD-1C7E-4CDA-B83C4EC97C46}"/>
           </ac:picMkLst>
         </pc:picChg>
-        <pc:picChg chg="add del">
-          <ac:chgData name="Matthias Kuhn" userId="9470fd36f9d6358f" providerId="LiveId" clId="{97A9E315-7109-471F-9DC5-2BF2F78B4932}" dt="2025-03-19T14:58:19.270" v="1126" actId="478"/>
-          <ac:picMkLst>
-            <pc:docMk/>
-            <pc:sldMk cId="1106488637" sldId="282"/>
-            <ac:picMk id="49" creationId="{2B345E36-9455-8E4C-415C-9D35E34B4B6A}"/>
-          </ac:picMkLst>
-        </pc:picChg>
-        <pc:picChg chg="add del mod">
-          <ac:chgData name="Matthias Kuhn" userId="9470fd36f9d6358f" providerId="LiveId" clId="{97A9E315-7109-471F-9DC5-2BF2F78B4932}" dt="2025-03-19T09:50:11.659" v="106" actId="478"/>
-          <ac:picMkLst>
-            <pc:docMk/>
-            <pc:sldMk cId="1106488637" sldId="282"/>
-            <ac:picMk id="1028" creationId="{FDD629A9-2888-7AE1-DE49-A91CD1256820}"/>
-          </ac:picMkLst>
-        </pc:picChg>
       </pc:sldChg>
       <pc:sldChg chg="addSp delSp modSp add mod">
         <pc:chgData name="Matthias Kuhn" userId="9470fd36f9d6358f" providerId="LiveId" clId="{97A9E315-7109-471F-9DC5-2BF2F78B4932}" dt="2025-03-19T22:10:46.126" v="1143" actId="478"/>
@@ -484,22 +291,6 @@
           <pc:docMk/>
           <pc:sldMk cId="4078144345" sldId="283"/>
         </pc:sldMkLst>
-        <pc:spChg chg="del">
-          <ac:chgData name="Matthias Kuhn" userId="9470fd36f9d6358f" providerId="LiveId" clId="{97A9E315-7109-471F-9DC5-2BF2F78B4932}" dt="2025-03-19T09:41:34.298" v="31" actId="478"/>
-          <ac:spMkLst>
-            <pc:docMk/>
-            <pc:sldMk cId="4078144345" sldId="283"/>
-            <ac:spMk id="3" creationId="{57F487B5-3E5F-CE1A-FD81-FA62DF1055AC}"/>
-          </ac:spMkLst>
-        </pc:spChg>
-        <pc:spChg chg="del">
-          <ac:chgData name="Matthias Kuhn" userId="9470fd36f9d6358f" providerId="LiveId" clId="{97A9E315-7109-471F-9DC5-2BF2F78B4932}" dt="2025-03-19T09:41:42.342" v="32" actId="478"/>
-          <ac:spMkLst>
-            <pc:docMk/>
-            <pc:sldMk cId="4078144345" sldId="283"/>
-            <ac:spMk id="5" creationId="{D7828C54-955D-90BF-0393-604F7EBEAB28}"/>
-          </ac:spMkLst>
-        </pc:spChg>
         <pc:spChg chg="add mod">
           <ac:chgData name="Matthias Kuhn" userId="9470fd36f9d6358f" providerId="LiveId" clId="{97A9E315-7109-471F-9DC5-2BF2F78B4932}" dt="2025-03-19T21:37:29.590" v="1136" actId="1076"/>
           <ac:spMkLst>
@@ -516,14 +307,6 @@
             <ac:spMk id="14" creationId="{1AC97819-3C2C-E62E-FE27-279DB739C531}"/>
           </ac:spMkLst>
         </pc:spChg>
-        <pc:spChg chg="add mod">
-          <ac:chgData name="Matthias Kuhn" userId="9470fd36f9d6358f" providerId="LiveId" clId="{97A9E315-7109-471F-9DC5-2BF2F78B4932}" dt="2025-03-19T10:01:03.269" v="607"/>
-          <ac:spMkLst>
-            <pc:docMk/>
-            <pc:sldMk cId="4078144345" sldId="283"/>
-            <ac:spMk id="15" creationId="{B9772BE6-4CE2-01E2-1785-337D54F3A5AE}"/>
-          </ac:spMkLst>
-        </pc:spChg>
         <pc:spChg chg="mod">
           <ac:chgData name="Matthias Kuhn" userId="9470fd36f9d6358f" providerId="LiveId" clId="{97A9E315-7109-471F-9DC5-2BF2F78B4932}" dt="2025-03-19T10:03:44.827" v="727" actId="20577"/>
           <ac:spMkLst>
@@ -538,22 +321,6 @@
             <pc:docMk/>
             <pc:sldMk cId="4078144345" sldId="283"/>
             <ac:picMk id="2" creationId="{1D76A6AB-428A-1B0B-37CF-B14B60ED75BA}"/>
-          </ac:picMkLst>
-        </pc:picChg>
-        <pc:picChg chg="add del">
-          <ac:chgData name="Matthias Kuhn" userId="9470fd36f9d6358f" providerId="LiveId" clId="{97A9E315-7109-471F-9DC5-2BF2F78B4932}" dt="2025-03-19T09:42:46.009" v="37" actId="478"/>
-          <ac:picMkLst>
-            <pc:docMk/>
-            <pc:sldMk cId="4078144345" sldId="283"/>
-            <ac:picMk id="6" creationId="{8BCEE2F3-58CE-4E4D-003D-19FB969D0081}"/>
-          </ac:picMkLst>
-        </pc:picChg>
-        <pc:picChg chg="add del mod">
-          <ac:chgData name="Matthias Kuhn" userId="9470fd36f9d6358f" providerId="LiveId" clId="{97A9E315-7109-471F-9DC5-2BF2F78B4932}" dt="2025-03-19T09:44:01.865" v="46" actId="478"/>
-          <ac:picMkLst>
-            <pc:docMk/>
-            <pc:sldMk cId="4078144345" sldId="283"/>
-            <ac:picMk id="8" creationId="{FFE6E282-2FCA-3B92-9372-7D03FB81ADEF}"/>
           </ac:picMkLst>
         </pc:picChg>
         <pc:picChg chg="add mod">
@@ -588,22 +355,6 @@
             <ac:picMk id="20" creationId="{3CD150D3-FE1B-89B2-9C16-E3AA3E6948D6}"/>
           </ac:picMkLst>
         </pc:picChg>
-        <pc:picChg chg="add del">
-          <ac:chgData name="Matthias Kuhn" userId="9470fd36f9d6358f" providerId="LiveId" clId="{97A9E315-7109-471F-9DC5-2BF2F78B4932}" dt="2025-03-19T22:10:46.126" v="1143" actId="478"/>
-          <ac:picMkLst>
-            <pc:docMk/>
-            <pc:sldMk cId="4078144345" sldId="283"/>
-            <ac:picMk id="22" creationId="{E9CD2082-5403-5A95-5AEC-7B30CA2FFDAF}"/>
-          </ac:picMkLst>
-        </pc:picChg>
-        <pc:picChg chg="del">
-          <ac:chgData name="Matthias Kuhn" userId="9470fd36f9d6358f" providerId="LiveId" clId="{97A9E315-7109-471F-9DC5-2BF2F78B4932}" dt="2025-03-19T09:41:17.365" v="27" actId="478"/>
-          <ac:picMkLst>
-            <pc:docMk/>
-            <pc:sldMk cId="4078144345" sldId="283"/>
-            <ac:picMk id="1028" creationId="{10905226-FB4F-E9E6-00A0-C6F73AE621AF}"/>
-          </ac:picMkLst>
-        </pc:picChg>
       </pc:sldChg>
       <pc:sldChg chg="addSp delSp modSp add mod">
         <pc:chgData name="Matthias Kuhn" userId="9470fd36f9d6358f" providerId="LiveId" clId="{97A9E315-7109-471F-9DC5-2BF2F78B4932}" dt="2025-03-19T10:32:47.357" v="907" actId="20577"/>
@@ -635,22 +386,6 @@
             <ac:spMk id="19" creationId="{E4808669-9904-07CB-1392-9CC2AE919B55}"/>
           </ac:spMkLst>
         </pc:spChg>
-        <pc:picChg chg="del">
-          <ac:chgData name="Matthias Kuhn" userId="9470fd36f9d6358f" providerId="LiveId" clId="{97A9E315-7109-471F-9DC5-2BF2F78B4932}" dt="2025-03-19T10:09:01.925" v="736" actId="478"/>
-          <ac:picMkLst>
-            <pc:docMk/>
-            <pc:sldMk cId="1327216080" sldId="284"/>
-            <ac:picMk id="2" creationId="{EE3DCEBB-113A-9C57-E63A-99E6319C1921}"/>
-          </ac:picMkLst>
-        </pc:picChg>
-        <pc:picChg chg="add del mod">
-          <ac:chgData name="Matthias Kuhn" userId="9470fd36f9d6358f" providerId="LiveId" clId="{97A9E315-7109-471F-9DC5-2BF2F78B4932}" dt="2025-03-19T10:14:12.876" v="824" actId="478"/>
-          <ac:picMkLst>
-            <pc:docMk/>
-            <pc:sldMk cId="1327216080" sldId="284"/>
-            <ac:picMk id="4" creationId="{C473BD2A-4686-EC53-EB4E-0A18C1D43DC6}"/>
-          </ac:picMkLst>
-        </pc:picChg>
         <pc:picChg chg="add mod">
           <ac:chgData name="Matthias Kuhn" userId="9470fd36f9d6358f" providerId="LiveId" clId="{97A9E315-7109-471F-9DC5-2BF2F78B4932}" dt="2025-03-19T10:30:50.476" v="842" actId="14100"/>
           <ac:picMkLst>
@@ -667,22 +402,6 @@
             <ac:picMk id="8" creationId="{1C1D2E16-8C57-968E-18A6-D91B1634907D}"/>
           </ac:picMkLst>
         </pc:picChg>
-        <pc:picChg chg="del">
-          <ac:chgData name="Matthias Kuhn" userId="9470fd36f9d6358f" providerId="LiveId" clId="{97A9E315-7109-471F-9DC5-2BF2F78B4932}" dt="2025-03-19T10:09:03.943" v="738" actId="478"/>
-          <ac:picMkLst>
-            <pc:docMk/>
-            <pc:sldMk cId="1327216080" sldId="284"/>
-            <ac:picMk id="10" creationId="{51F51ACC-A70B-318D-1E51-74BDA5199466}"/>
-          </ac:picMkLst>
-        </pc:picChg>
-        <pc:picChg chg="del">
-          <ac:chgData name="Matthias Kuhn" userId="9470fd36f9d6358f" providerId="LiveId" clId="{97A9E315-7109-471F-9DC5-2BF2F78B4932}" dt="2025-03-19T10:09:02.717" v="737" actId="478"/>
-          <ac:picMkLst>
-            <pc:docMk/>
-            <pc:sldMk cId="1327216080" sldId="284"/>
-            <ac:picMk id="12" creationId="{FBF34E1C-71D0-D511-CA2A-E51EFE19EEC1}"/>
-          </ac:picMkLst>
-        </pc:picChg>
       </pc:sldChg>
       <pc:sldChg chg="addSp delSp modSp add mod">
         <pc:chgData name="Matthias Kuhn" userId="9470fd36f9d6358f" providerId="LiveId" clId="{97A9E315-7109-471F-9DC5-2BF2F78B4932}" dt="2025-03-19T10:40:04.801" v="962" actId="1076"/>
@@ -690,22 +409,6 @@
           <pc:docMk/>
           <pc:sldMk cId="1782593545" sldId="285"/>
         </pc:sldMkLst>
-        <pc:spChg chg="del">
-          <ac:chgData name="Matthias Kuhn" userId="9470fd36f9d6358f" providerId="LiveId" clId="{97A9E315-7109-471F-9DC5-2BF2F78B4932}" dt="2025-03-19T10:34:18.825" v="911" actId="478"/>
-          <ac:spMkLst>
-            <pc:docMk/>
-            <pc:sldMk cId="1782593545" sldId="285"/>
-            <ac:spMk id="13" creationId="{18DA96F0-E7D8-5C36-4F8C-61567804FB10}"/>
-          </ac:spMkLst>
-        </pc:spChg>
-        <pc:spChg chg="del">
-          <ac:chgData name="Matthias Kuhn" userId="9470fd36f9d6358f" providerId="LiveId" clId="{97A9E315-7109-471F-9DC5-2BF2F78B4932}" dt="2025-03-19T10:34:19.793" v="912" actId="478"/>
-          <ac:spMkLst>
-            <pc:docMk/>
-            <pc:sldMk cId="1782593545" sldId="285"/>
-            <ac:spMk id="14" creationId="{63575576-F8BF-9DF3-05E4-496876204DE8}"/>
-          </ac:spMkLst>
-        </pc:spChg>
         <pc:spChg chg="mod">
           <ac:chgData name="Matthias Kuhn" userId="9470fd36f9d6358f" providerId="LiveId" clId="{97A9E315-7109-471F-9DC5-2BF2F78B4932}" dt="2025-03-19T10:35:14.425" v="961" actId="20577"/>
           <ac:spMkLst>
@@ -722,20 +425,35 @@
             <ac:picMk id="3" creationId="{BE3630AC-F7ED-78ED-8D09-46560A3D7F85}"/>
           </ac:picMkLst>
         </pc:picChg>
-        <pc:picChg chg="del">
-          <ac:chgData name="Matthias Kuhn" userId="9470fd36f9d6358f" providerId="LiveId" clId="{97A9E315-7109-471F-9DC5-2BF2F78B4932}" dt="2025-03-19T10:34:17.552" v="910" actId="478"/>
+      </pc:sldChg>
+      <pc:sldChg chg="addSp delSp modSp new del mod">
+        <pc:chgData name="Matthias Kuhn" userId="9470fd36f9d6358f" providerId="LiveId" clId="{97A9E315-7109-471F-9DC5-2BF2F78B4932}" dt="2025-03-28T15:29:38.702" v="1152" actId="2696"/>
+        <pc:sldMkLst>
+          <pc:docMk/>
+          <pc:sldMk cId="231302406" sldId="286"/>
+        </pc:sldMkLst>
+        <pc:spChg chg="del">
+          <ac:chgData name="Matthias Kuhn" userId="9470fd36f9d6358f" providerId="LiveId" clId="{97A9E315-7109-471F-9DC5-2BF2F78B4932}" dt="2025-03-28T15:16:06.496" v="1146" actId="478"/>
+          <ac:spMkLst>
+            <pc:docMk/>
+            <pc:sldMk cId="231302406" sldId="286"/>
+            <ac:spMk id="2" creationId="{E6BF6107-9FCF-2C2C-FB17-E5F2DDC8DBD0}"/>
+          </ac:spMkLst>
+        </pc:spChg>
+        <pc:spChg chg="del">
+          <ac:chgData name="Matthias Kuhn" userId="9470fd36f9d6358f" providerId="LiveId" clId="{97A9E315-7109-471F-9DC5-2BF2F78B4932}" dt="2025-03-28T15:16:07.991" v="1147" actId="478"/>
+          <ac:spMkLst>
+            <pc:docMk/>
+            <pc:sldMk cId="231302406" sldId="286"/>
+            <ac:spMk id="3" creationId="{18D3450D-5BA9-4C12-15AF-B717A0D30865}"/>
+          </ac:spMkLst>
+        </pc:spChg>
+        <pc:picChg chg="add mod">
+          <ac:chgData name="Matthias Kuhn" userId="9470fd36f9d6358f" providerId="LiveId" clId="{97A9E315-7109-471F-9DC5-2BF2F78B4932}" dt="2025-03-28T15:18:05.924" v="1151" actId="14100"/>
           <ac:picMkLst>
             <pc:docMk/>
-            <pc:sldMk cId="1782593545" sldId="285"/>
-            <ac:picMk id="6" creationId="{7BE22973-6AF4-C1F9-7AD9-1E56DB3249FC}"/>
-          </ac:picMkLst>
-        </pc:picChg>
-        <pc:picChg chg="del">
-          <ac:chgData name="Matthias Kuhn" userId="9470fd36f9d6358f" providerId="LiveId" clId="{97A9E315-7109-471F-9DC5-2BF2F78B4932}" dt="2025-03-19T10:34:16.598" v="909" actId="478"/>
-          <ac:picMkLst>
-            <pc:docMk/>
-            <pc:sldMk cId="1782593545" sldId="285"/>
-            <ac:picMk id="8" creationId="{75A1C547-E103-A349-A010-43D487FB4F2A}"/>
+            <pc:sldMk cId="231302406" sldId="286"/>
+            <ac:picMk id="5" creationId="{A5CB0901-129A-3ADC-26F4-27721A3A4ADB}"/>
           </ac:picMkLst>
         </pc:picChg>
       </pc:sldChg>
@@ -891,7 +609,7 @@
           <a:p>
             <a:fld id="{71FD7FF2-845F-41B9-944F-35B90659B7D6}" type="datetimeFigureOut">
               <a:rPr lang="en-US" smtClean="0"/>
-              <a:t>3/19/2025</a:t>
+              <a:t>3/28/2025</a:t>
             </a:fld>
             <a:endParaRPr lang="en-US"/>
           </a:p>
@@ -1089,7 +807,7 @@
           <a:p>
             <a:fld id="{71FD7FF2-845F-41B9-944F-35B90659B7D6}" type="datetimeFigureOut">
               <a:rPr lang="en-US" smtClean="0"/>
-              <a:t>3/19/2025</a:t>
+              <a:t>3/28/2025</a:t>
             </a:fld>
             <a:endParaRPr lang="en-US"/>
           </a:p>
@@ -1297,7 +1015,7 @@
           <a:p>
             <a:fld id="{71FD7FF2-845F-41B9-944F-35B90659B7D6}" type="datetimeFigureOut">
               <a:rPr lang="en-US" smtClean="0"/>
-              <a:t>3/19/2025</a:t>
+              <a:t>3/28/2025</a:t>
             </a:fld>
             <a:endParaRPr lang="en-US"/>
           </a:p>
@@ -1495,7 +1213,7 @@
           <a:p>
             <a:fld id="{71FD7FF2-845F-41B9-944F-35B90659B7D6}" type="datetimeFigureOut">
               <a:rPr lang="en-US" smtClean="0"/>
-              <a:t>3/19/2025</a:t>
+              <a:t>3/28/2025</a:t>
             </a:fld>
             <a:endParaRPr lang="en-US"/>
           </a:p>
@@ -1770,7 +1488,7 @@
           <a:p>
             <a:fld id="{71FD7FF2-845F-41B9-944F-35B90659B7D6}" type="datetimeFigureOut">
               <a:rPr lang="en-US" smtClean="0"/>
-              <a:t>3/19/2025</a:t>
+              <a:t>3/28/2025</a:t>
             </a:fld>
             <a:endParaRPr lang="en-US"/>
           </a:p>
@@ -2035,7 +1753,7 @@
           <a:p>
             <a:fld id="{71FD7FF2-845F-41B9-944F-35B90659B7D6}" type="datetimeFigureOut">
               <a:rPr lang="en-US" smtClean="0"/>
-              <a:t>3/19/2025</a:t>
+              <a:t>3/28/2025</a:t>
             </a:fld>
             <a:endParaRPr lang="en-US"/>
           </a:p>
@@ -2447,7 +2165,7 @@
           <a:p>
             <a:fld id="{71FD7FF2-845F-41B9-944F-35B90659B7D6}" type="datetimeFigureOut">
               <a:rPr lang="en-US" smtClean="0"/>
-              <a:t>3/19/2025</a:t>
+              <a:t>3/28/2025</a:t>
             </a:fld>
             <a:endParaRPr lang="en-US"/>
           </a:p>
@@ -2588,7 +2306,7 @@
           <a:p>
             <a:fld id="{71FD7FF2-845F-41B9-944F-35B90659B7D6}" type="datetimeFigureOut">
               <a:rPr lang="en-US" smtClean="0"/>
-              <a:t>3/19/2025</a:t>
+              <a:t>3/28/2025</a:t>
             </a:fld>
             <a:endParaRPr lang="en-US"/>
           </a:p>
@@ -2701,7 +2419,7 @@
           <a:p>
             <a:fld id="{71FD7FF2-845F-41B9-944F-35B90659B7D6}" type="datetimeFigureOut">
               <a:rPr lang="en-US" smtClean="0"/>
-              <a:t>3/19/2025</a:t>
+              <a:t>3/28/2025</a:t>
             </a:fld>
             <a:endParaRPr lang="en-US"/>
           </a:p>
@@ -3012,7 +2730,7 @@
           <a:p>
             <a:fld id="{71FD7FF2-845F-41B9-944F-35B90659B7D6}" type="datetimeFigureOut">
               <a:rPr lang="en-US" smtClean="0"/>
-              <a:t>3/19/2025</a:t>
+              <a:t>3/28/2025</a:t>
             </a:fld>
             <a:endParaRPr lang="en-US"/>
           </a:p>
@@ -3300,7 +3018,7 @@
           <a:p>
             <a:fld id="{71FD7FF2-845F-41B9-944F-35B90659B7D6}" type="datetimeFigureOut">
               <a:rPr lang="en-US" smtClean="0"/>
-              <a:t>3/19/2025</a:t>
+              <a:t>3/28/2025</a:t>
             </a:fld>
             <a:endParaRPr lang="en-US"/>
           </a:p>
@@ -3541,7 +3259,7 @@
           <a:p>
             <a:fld id="{71FD7FF2-845F-41B9-944F-35B90659B7D6}" type="datetimeFigureOut">
               <a:rPr lang="en-US" smtClean="0"/>
-              <a:t>3/19/2025</a:t>
+              <a:t>3/28/2025</a:t>
             </a:fld>
             <a:endParaRPr lang="en-US"/>
           </a:p>
@@ -7618,7 +7336,7 @@
         </p:blipFill>
         <p:spPr>
           <a:xfrm>
-            <a:off x="1999689" y="4027024"/>
+            <a:off x="1999689" y="4033374"/>
             <a:ext cx="7906853" cy="2095792"/>
           </a:xfrm>
           <a:prstGeom prst="rect">

</xml_diff>